<commit_message>
update docs to ellipsoid
</commit_message>
<xml_diff>
--- a/documentation/geometryBaseTypes.pptx
+++ b/documentation/geometryBaseTypes.pptx
@@ -259,7 +259,7 @@
           <a:p>
             <a:fld id="{715DB31A-0B2B-4E58-B8E4-5EFF1931F507}" type="datetimeFigureOut">
               <a:rPr lang="de-DE" smtClean="0"/>
-              <a:t>17.11.2023</a:t>
+              <a:t>24.11.2024</a:t>
             </a:fld>
             <a:endParaRPr lang="de-DE"/>
           </a:p>
@@ -457,7 +457,7 @@
           <a:p>
             <a:fld id="{715DB31A-0B2B-4E58-B8E4-5EFF1931F507}" type="datetimeFigureOut">
               <a:rPr lang="de-DE" smtClean="0"/>
-              <a:t>17.11.2023</a:t>
+              <a:t>24.11.2024</a:t>
             </a:fld>
             <a:endParaRPr lang="de-DE"/>
           </a:p>
@@ -665,7 +665,7 @@
           <a:p>
             <a:fld id="{715DB31A-0B2B-4E58-B8E4-5EFF1931F507}" type="datetimeFigureOut">
               <a:rPr lang="de-DE" smtClean="0"/>
-              <a:t>17.11.2023</a:t>
+              <a:t>24.11.2024</a:t>
             </a:fld>
             <a:endParaRPr lang="de-DE"/>
           </a:p>
@@ -863,7 +863,7 @@
           <a:p>
             <a:fld id="{715DB31A-0B2B-4E58-B8E4-5EFF1931F507}" type="datetimeFigureOut">
               <a:rPr lang="de-DE" smtClean="0"/>
-              <a:t>17.11.2023</a:t>
+              <a:t>24.11.2024</a:t>
             </a:fld>
             <a:endParaRPr lang="de-DE"/>
           </a:p>
@@ -1138,7 +1138,7 @@
           <a:p>
             <a:fld id="{715DB31A-0B2B-4E58-B8E4-5EFF1931F507}" type="datetimeFigureOut">
               <a:rPr lang="de-DE" smtClean="0"/>
-              <a:t>17.11.2023</a:t>
+              <a:t>24.11.2024</a:t>
             </a:fld>
             <a:endParaRPr lang="de-DE"/>
           </a:p>
@@ -1403,7 +1403,7 @@
           <a:p>
             <a:fld id="{715DB31A-0B2B-4E58-B8E4-5EFF1931F507}" type="datetimeFigureOut">
               <a:rPr lang="de-DE" smtClean="0"/>
-              <a:t>17.11.2023</a:t>
+              <a:t>24.11.2024</a:t>
             </a:fld>
             <a:endParaRPr lang="de-DE"/>
           </a:p>
@@ -1815,7 +1815,7 @@
           <a:p>
             <a:fld id="{715DB31A-0B2B-4E58-B8E4-5EFF1931F507}" type="datetimeFigureOut">
               <a:rPr lang="de-DE" smtClean="0"/>
-              <a:t>17.11.2023</a:t>
+              <a:t>24.11.2024</a:t>
             </a:fld>
             <a:endParaRPr lang="de-DE"/>
           </a:p>
@@ -1956,7 +1956,7 @@
           <a:p>
             <a:fld id="{715DB31A-0B2B-4E58-B8E4-5EFF1931F507}" type="datetimeFigureOut">
               <a:rPr lang="de-DE" smtClean="0"/>
-              <a:t>17.11.2023</a:t>
+              <a:t>24.11.2024</a:t>
             </a:fld>
             <a:endParaRPr lang="de-DE"/>
           </a:p>
@@ -2069,7 +2069,7 @@
           <a:p>
             <a:fld id="{715DB31A-0B2B-4E58-B8E4-5EFF1931F507}" type="datetimeFigureOut">
               <a:rPr lang="de-DE" smtClean="0"/>
-              <a:t>17.11.2023</a:t>
+              <a:t>24.11.2024</a:t>
             </a:fld>
             <a:endParaRPr lang="de-DE"/>
           </a:p>
@@ -2380,7 +2380,7 @@
           <a:p>
             <a:fld id="{715DB31A-0B2B-4E58-B8E4-5EFF1931F507}" type="datetimeFigureOut">
               <a:rPr lang="de-DE" smtClean="0"/>
-              <a:t>17.11.2023</a:t>
+              <a:t>24.11.2024</a:t>
             </a:fld>
             <a:endParaRPr lang="de-DE"/>
           </a:p>
@@ -2668,7 +2668,7 @@
           <a:p>
             <a:fld id="{715DB31A-0B2B-4E58-B8E4-5EFF1931F507}" type="datetimeFigureOut">
               <a:rPr lang="de-DE" smtClean="0"/>
-              <a:t>17.11.2023</a:t>
+              <a:t>24.11.2024</a:t>
             </a:fld>
             <a:endParaRPr lang="de-DE"/>
           </a:p>
@@ -2909,7 +2909,7 @@
           <a:p>
             <a:fld id="{715DB31A-0B2B-4E58-B8E4-5EFF1931F507}" type="datetimeFigureOut">
               <a:rPr lang="de-DE" smtClean="0"/>
-              <a:t>17.11.2023</a:t>
+              <a:t>24.11.2024</a:t>
             </a:fld>
             <a:endParaRPr lang="de-DE"/>
           </a:p>
@@ -4207,75 +4207,6 @@
           </p:sp>
         </mc:Fallback>
       </mc:AlternateContent>
-      <p:sp>
-        <p:nvSpPr>
-          <p:cNvPr id="50" name="Ellipse 49">
-            <a:extLst>
-              <a:ext uri="{FF2B5EF4-FFF2-40B4-BE49-F238E27FC236}">
-                <a16:creationId xmlns:a16="http://schemas.microsoft.com/office/drawing/2014/main" id="{8F9EFF71-0DB8-45BE-9FB1-31905E88CB9F}"/>
-              </a:ext>
-            </a:extLst>
-          </p:cNvPr>
-          <p:cNvSpPr/>
-          <p:nvPr/>
-        </p:nvSpPr>
-        <p:spPr>
-          <a:xfrm>
-            <a:off x="5960997" y="3327411"/>
-            <a:ext cx="60736" cy="60736"/>
-          </a:xfrm>
-          <a:prstGeom prst="ellipse">
-            <a:avLst/>
-          </a:prstGeom>
-          <a:solidFill>
-            <a:schemeClr val="tx1">
-              <a:lumMod val="85000"/>
-              <a:lumOff val="15000"/>
-            </a:schemeClr>
-          </a:solidFill>
-          <a:ln>
-            <a:noFill/>
-          </a:ln>
-          <a:effectLst/>
-          <a:scene3d>
-            <a:camera prst="isometricOffAxis1Top"/>
-            <a:lightRig rig="threePt" dir="t"/>
-          </a:scene3d>
-          <a:sp3d>
-            <a:bevelT w="30480" h="30480"/>
-            <a:bevelB w="30480" h="30480"/>
-          </a:sp3d>
-        </p:spPr>
-        <p:style>
-          <a:lnRef idx="2">
-            <a:schemeClr val="accent1">
-              <a:shade val="50000"/>
-            </a:schemeClr>
-          </a:lnRef>
-          <a:fillRef idx="1">
-            <a:schemeClr val="accent1"/>
-          </a:fillRef>
-          <a:effectRef idx="0">
-            <a:schemeClr val="accent1"/>
-          </a:effectRef>
-          <a:fontRef idx="minor">
-            <a:schemeClr val="lt1"/>
-          </a:fontRef>
-        </p:style>
-        <p:txBody>
-          <a:bodyPr rot="0" spcFirstLastPara="0" vertOverflow="overflow" horzOverflow="overflow" vert="horz" wrap="square" lIns="91440" tIns="45720" rIns="91440" bIns="45720" numCol="1" spcCol="0" rtlCol="0" fromWordArt="0" anchor="ctr" anchorCtr="0" forceAA="0" compatLnSpc="1">
-            <a:prstTxWarp prst="textNoShape">
-              <a:avLst/>
-            </a:prstTxWarp>
-            <a:noAutofit/>
-          </a:bodyPr>
-          <a:lstStyle/>
-          <a:p>
-            <a:pPr algn="ctr"/>
-            <a:endParaRPr lang="de-DE"/>
-          </a:p>
-        </p:txBody>
-      </p:sp>
       <mc:AlternateContent xmlns:mc="http://schemas.openxmlformats.org/markup-compatibility/2006" xmlns:a14="http://schemas.microsoft.com/office/drawing/2010/main">
         <mc:Choice Requires="a14">
           <p:sp>
@@ -4990,8 +4921,8 @@
         </p:nvCxnSpPr>
         <p:spPr>
           <a:xfrm>
-            <a:off x="5988414" y="3387154"/>
-            <a:ext cx="495748" cy="200231"/>
+            <a:off x="5999922" y="3393887"/>
+            <a:ext cx="464698" cy="224231"/>
           </a:xfrm>
           <a:prstGeom prst="straightConnector1">
             <a:avLst/>
@@ -5037,8 +4968,8 @@
         </p:nvSpPr>
         <p:spPr>
           <a:xfrm>
-            <a:off x="6430266" y="3533386"/>
-            <a:ext cx="503664" cy="246221"/>
+            <a:off x="6217215" y="3345140"/>
+            <a:ext cx="316112" cy="246221"/>
           </a:xfrm>
           <a:prstGeom prst="rect">
             <a:avLst/>
@@ -5052,10 +4983,9 @@
           <a:lstStyle/>
           <a:p>
             <a:r>
-              <a:rPr lang="de-DE" sz="1000" dirty="0" err="1"/>
-              <a:t>radius</a:t>
-            </a:r>
-            <a:endParaRPr lang="de-DE" sz="1000" dirty="0"/>
+              <a:rPr lang="de-DE" sz="1000" dirty="0"/>
+              <a:t>b*</a:t>
+            </a:r>
           </a:p>
         </p:txBody>
       </p:sp>
@@ -6032,7 +5962,7 @@
         <p:spPr>
           <a:xfrm>
             <a:off x="5675927" y="1789586"/>
-            <a:ext cx="695255" cy="307777"/>
+            <a:ext cx="792909" cy="307777"/>
           </a:xfrm>
           <a:prstGeom prst="rect">
             <a:avLst/>
@@ -6046,10 +5976,9 @@
           <a:lstStyle/>
           <a:p>
             <a:r>
-              <a:rPr lang="de-DE" sz="1400" dirty="0" err="1"/>
-              <a:t>Sphere</a:t>
-            </a:r>
-            <a:endParaRPr lang="de-DE" sz="1400" dirty="0"/>
+              <a:rPr lang="de-DE" sz="1400" dirty="0"/>
+              <a:t>Ellipsoid</a:t>
+            </a:r>
           </a:p>
         </p:txBody>
       </p:sp>
@@ -6329,8 +6258,8 @@
           </p:sp>
         </mc:Fallback>
       </mc:AlternateContent>
-      <mc:AlternateContent xmlns:mc="http://schemas.openxmlformats.org/markup-compatibility/2006">
-        <mc:Choice xmlns:a14="http://schemas.microsoft.com/office/drawing/2010/main" Requires="a14">
+      <mc:AlternateContent xmlns:mc="http://schemas.openxmlformats.org/markup-compatibility/2006" xmlns:a14="http://schemas.microsoft.com/office/drawing/2010/main">
+        <mc:Choice Requires="a14">
           <p:sp>
             <p:nvSpPr>
               <p:cNvPr id="95" name="Textfeld 94">
@@ -6380,7 +6309,7 @@
             </p:txBody>
           </p:sp>
         </mc:Choice>
-        <mc:Fallback>
+        <mc:Fallback xmlns="">
           <p:sp>
             <p:nvSpPr>
               <p:cNvPr id="95" name="Textfeld 94">
@@ -7517,8 +7446,8 @@
           </p:sp>
         </mc:Fallback>
       </mc:AlternateContent>
-      <mc:AlternateContent xmlns:mc="http://schemas.openxmlformats.org/markup-compatibility/2006">
-        <mc:Choice xmlns:a14="http://schemas.microsoft.com/office/drawing/2010/main" Requires="a14">
+      <mc:AlternateContent xmlns:mc="http://schemas.openxmlformats.org/markup-compatibility/2006" xmlns:a14="http://schemas.microsoft.com/office/drawing/2010/main">
+        <mc:Choice Requires="a14">
           <p:sp>
             <p:nvSpPr>
               <p:cNvPr id="119" name="Textfeld 118">
@@ -7571,7 +7500,7 @@
             </p:txBody>
           </p:sp>
         </mc:Choice>
-        <mc:Fallback>
+        <mc:Fallback xmlns="">
           <p:sp>
             <p:nvSpPr>
               <p:cNvPr id="119" name="Textfeld 118">
@@ -8111,8 +8040,8 @@
           </a:p>
         </p:txBody>
       </p:sp>
-      <mc:AlternateContent xmlns:mc="http://schemas.openxmlformats.org/markup-compatibility/2006">
-        <mc:Choice xmlns:a14="http://schemas.microsoft.com/office/drawing/2010/main" Requires="a14">
+      <mc:AlternateContent xmlns:mc="http://schemas.openxmlformats.org/markup-compatibility/2006" xmlns:a14="http://schemas.microsoft.com/office/drawing/2010/main">
+        <mc:Choice Requires="a14">
           <p:sp>
             <p:nvSpPr>
               <p:cNvPr id="102" name="Textfeld 101">
@@ -8162,7 +8091,7 @@
             </p:txBody>
           </p:sp>
         </mc:Choice>
-        <mc:Fallback>
+        <mc:Fallback xmlns="">
           <p:sp>
             <p:nvSpPr>
               <p:cNvPr id="102" name="Textfeld 101">
@@ -8207,8 +8136,8 @@
           </p:sp>
         </mc:Fallback>
       </mc:AlternateContent>
-      <mc:AlternateContent xmlns:mc="http://schemas.openxmlformats.org/markup-compatibility/2006">
-        <mc:Choice xmlns:a14="http://schemas.microsoft.com/office/drawing/2010/main" Requires="a14">
+      <mc:AlternateContent xmlns:mc="http://schemas.openxmlformats.org/markup-compatibility/2006" xmlns:a14="http://schemas.microsoft.com/office/drawing/2010/main">
+        <mc:Choice Requires="a14">
           <p:sp>
             <p:nvSpPr>
               <p:cNvPr id="103" name="Textfeld 102">
@@ -8258,7 +8187,7 @@
             </p:txBody>
           </p:sp>
         </mc:Choice>
-        <mc:Fallback>
+        <mc:Fallback xmlns="">
           <p:sp>
             <p:nvSpPr>
               <p:cNvPr id="103" name="Textfeld 102">
@@ -8303,8 +8232,8 @@
           </p:sp>
         </mc:Fallback>
       </mc:AlternateContent>
-      <mc:AlternateContent xmlns:mc="http://schemas.openxmlformats.org/markup-compatibility/2006">
-        <mc:Choice xmlns:a14="http://schemas.microsoft.com/office/drawing/2010/main" Requires="a14">
+      <mc:AlternateContent xmlns:mc="http://schemas.openxmlformats.org/markup-compatibility/2006" xmlns:a14="http://schemas.microsoft.com/office/drawing/2010/main">
+        <mc:Choice Requires="a14">
           <p:sp>
             <p:nvSpPr>
               <p:cNvPr id="104" name="Textfeld 103">
@@ -8354,7 +8283,7 @@
             </p:txBody>
           </p:sp>
         </mc:Choice>
-        <mc:Fallback>
+        <mc:Fallback xmlns="">
           <p:sp>
             <p:nvSpPr>
               <p:cNvPr id="104" name="Textfeld 103">
@@ -8731,6 +8660,287 @@
             <a:r>
               <a:rPr lang="de-DE" sz="800" dirty="0"/>
               <a:t> = 90°</a:t>
+            </a:r>
+          </a:p>
+        </p:txBody>
+      </p:sp>
+      <p:cxnSp>
+        <p:nvCxnSpPr>
+          <p:cNvPr id="108" name="Gerade Verbindung mit Pfeil 107">
+            <a:extLst>
+              <a:ext uri="{FF2B5EF4-FFF2-40B4-BE49-F238E27FC236}">
+                <a16:creationId xmlns:a16="http://schemas.microsoft.com/office/drawing/2014/main" id="{B7858CAB-2B3A-4F97-85A7-A76E19B100E3}"/>
+              </a:ext>
+            </a:extLst>
+          </p:cNvPr>
+          <p:cNvCxnSpPr>
+            <a:cxnSpLocks/>
+          </p:cNvCxnSpPr>
+          <p:nvPr/>
+        </p:nvCxnSpPr>
+        <p:spPr>
+          <a:xfrm flipH="1">
+            <a:off x="5475584" y="3383203"/>
+            <a:ext cx="517536" cy="85048"/>
+          </a:xfrm>
+          <a:prstGeom prst="straightConnector1">
+            <a:avLst/>
+          </a:prstGeom>
+          <a:ln w="9525">
+            <a:solidFill>
+              <a:schemeClr val="tx1">
+                <a:lumMod val="85000"/>
+                <a:lumOff val="15000"/>
+              </a:schemeClr>
+            </a:solidFill>
+            <a:prstDash val="sysDash"/>
+            <a:headEnd type="none" w="sm" len="sm"/>
+            <a:tailEnd type="triangle" w="sm" len="sm"/>
+          </a:ln>
+        </p:spPr>
+        <p:style>
+          <a:lnRef idx="1">
+            <a:schemeClr val="accent1"/>
+          </a:lnRef>
+          <a:fillRef idx="0">
+            <a:schemeClr val="accent1"/>
+          </a:fillRef>
+          <a:effectRef idx="0">
+            <a:schemeClr val="accent1"/>
+          </a:effectRef>
+          <a:fontRef idx="minor">
+            <a:schemeClr val="tx1"/>
+          </a:fontRef>
+        </p:style>
+      </p:cxnSp>
+      <p:sp>
+        <p:nvSpPr>
+          <p:cNvPr id="123" name="Textfeld 122">
+            <a:extLst>
+              <a:ext uri="{FF2B5EF4-FFF2-40B4-BE49-F238E27FC236}">
+                <a16:creationId xmlns:a16="http://schemas.microsoft.com/office/drawing/2014/main" id="{8BF809FE-920B-4E76-8ED5-F84827CC6936}"/>
+              </a:ext>
+            </a:extLst>
+          </p:cNvPr>
+          <p:cNvSpPr txBox="1"/>
+          <p:nvPr/>
+        </p:nvSpPr>
+        <p:spPr>
+          <a:xfrm>
+            <a:off x="5589044" y="3379040"/>
+            <a:ext cx="251992" cy="246221"/>
+          </a:xfrm>
+          <a:prstGeom prst="rect">
+            <a:avLst/>
+          </a:prstGeom>
+          <a:noFill/>
+        </p:spPr>
+        <p:txBody>
+          <a:bodyPr wrap="none" rtlCol="0">
+            <a:spAutoFit/>
+          </a:bodyPr>
+          <a:lstStyle/>
+          <a:p>
+            <a:r>
+              <a:rPr lang="de-DE" sz="1000" dirty="0"/>
+              <a:t>a</a:t>
+            </a:r>
+          </a:p>
+        </p:txBody>
+      </p:sp>
+      <p:cxnSp>
+        <p:nvCxnSpPr>
+          <p:cNvPr id="124" name="Gerade Verbindung mit Pfeil 123">
+            <a:extLst>
+              <a:ext uri="{FF2B5EF4-FFF2-40B4-BE49-F238E27FC236}">
+                <a16:creationId xmlns:a16="http://schemas.microsoft.com/office/drawing/2014/main" id="{40F4E3B2-C32A-45FF-982D-36C6318C7DF4}"/>
+              </a:ext>
+            </a:extLst>
+          </p:cNvPr>
+          <p:cNvCxnSpPr>
+            <a:cxnSpLocks/>
+            <a:stCxn id="50" idx="4"/>
+          </p:cNvCxnSpPr>
+          <p:nvPr/>
+        </p:nvCxnSpPr>
+        <p:spPr>
+          <a:xfrm>
+            <a:off x="5991365" y="3388147"/>
+            <a:ext cx="8557" cy="495268"/>
+          </a:xfrm>
+          <a:prstGeom prst="straightConnector1">
+            <a:avLst/>
+          </a:prstGeom>
+          <a:ln w="9525">
+            <a:solidFill>
+              <a:schemeClr val="tx1">
+                <a:lumMod val="85000"/>
+                <a:lumOff val="15000"/>
+              </a:schemeClr>
+            </a:solidFill>
+            <a:prstDash val="sysDash"/>
+            <a:headEnd type="none" w="sm" len="sm"/>
+            <a:tailEnd type="triangle" w="sm" len="sm"/>
+          </a:ln>
+        </p:spPr>
+        <p:style>
+          <a:lnRef idx="1">
+            <a:schemeClr val="accent1"/>
+          </a:lnRef>
+          <a:fillRef idx="0">
+            <a:schemeClr val="accent1"/>
+          </a:fillRef>
+          <a:effectRef idx="0">
+            <a:schemeClr val="accent1"/>
+          </a:effectRef>
+          <a:fontRef idx="minor">
+            <a:schemeClr val="tx1"/>
+          </a:fontRef>
+        </p:style>
+      </p:cxnSp>
+      <p:sp>
+        <p:nvSpPr>
+          <p:cNvPr id="126" name="Textfeld 125">
+            <a:extLst>
+              <a:ext uri="{FF2B5EF4-FFF2-40B4-BE49-F238E27FC236}">
+                <a16:creationId xmlns:a16="http://schemas.microsoft.com/office/drawing/2014/main" id="{675FD27B-7969-4CDF-94AE-B026B05E3AEC}"/>
+              </a:ext>
+            </a:extLst>
+          </p:cNvPr>
+          <p:cNvSpPr txBox="1"/>
+          <p:nvPr/>
+        </p:nvSpPr>
+        <p:spPr>
+          <a:xfrm>
+            <a:off x="5938211" y="3612667"/>
+            <a:ext cx="303288" cy="246221"/>
+          </a:xfrm>
+          <a:prstGeom prst="rect">
+            <a:avLst/>
+          </a:prstGeom>
+          <a:noFill/>
+        </p:spPr>
+        <p:txBody>
+          <a:bodyPr wrap="none" rtlCol="0">
+            <a:spAutoFit/>
+          </a:bodyPr>
+          <a:lstStyle/>
+          <a:p>
+            <a:r>
+              <a:rPr lang="de-DE" sz="1000" dirty="0"/>
+              <a:t>c*</a:t>
+            </a:r>
+          </a:p>
+        </p:txBody>
+      </p:sp>
+      <p:sp>
+        <p:nvSpPr>
+          <p:cNvPr id="50" name="Ellipse 49">
+            <a:extLst>
+              <a:ext uri="{FF2B5EF4-FFF2-40B4-BE49-F238E27FC236}">
+                <a16:creationId xmlns:a16="http://schemas.microsoft.com/office/drawing/2014/main" id="{8F9EFF71-0DB8-45BE-9FB1-31905E88CB9F}"/>
+              </a:ext>
+            </a:extLst>
+          </p:cNvPr>
+          <p:cNvSpPr/>
+          <p:nvPr/>
+        </p:nvSpPr>
+        <p:spPr>
+          <a:xfrm>
+            <a:off x="5960997" y="3327411"/>
+            <a:ext cx="60736" cy="60736"/>
+          </a:xfrm>
+          <a:prstGeom prst="ellipse">
+            <a:avLst/>
+          </a:prstGeom>
+          <a:solidFill>
+            <a:schemeClr val="tx1">
+              <a:lumMod val="85000"/>
+              <a:lumOff val="15000"/>
+            </a:schemeClr>
+          </a:solidFill>
+          <a:ln>
+            <a:noFill/>
+          </a:ln>
+          <a:effectLst/>
+          <a:scene3d>
+            <a:camera prst="isometricOffAxis1Top"/>
+            <a:lightRig rig="threePt" dir="t"/>
+          </a:scene3d>
+          <a:sp3d>
+            <a:bevelT w="30480" h="30480"/>
+            <a:bevelB w="30480" h="30480"/>
+          </a:sp3d>
+        </p:spPr>
+        <p:style>
+          <a:lnRef idx="2">
+            <a:schemeClr val="accent1">
+              <a:shade val="50000"/>
+            </a:schemeClr>
+          </a:lnRef>
+          <a:fillRef idx="1">
+            <a:schemeClr val="accent1"/>
+          </a:fillRef>
+          <a:effectRef idx="0">
+            <a:schemeClr val="accent1"/>
+          </a:effectRef>
+          <a:fontRef idx="minor">
+            <a:schemeClr val="lt1"/>
+          </a:fontRef>
+        </p:style>
+        <p:txBody>
+          <a:bodyPr rot="0" spcFirstLastPara="0" vertOverflow="overflow" horzOverflow="overflow" vert="horz" wrap="square" lIns="91440" tIns="45720" rIns="91440" bIns="45720" numCol="1" spcCol="0" rtlCol="0" fromWordArt="0" anchor="ctr" anchorCtr="0" forceAA="0" compatLnSpc="1">
+            <a:prstTxWarp prst="textNoShape">
+              <a:avLst/>
+            </a:prstTxWarp>
+            <a:noAutofit/>
+          </a:bodyPr>
+          <a:lstStyle/>
+          <a:p>
+            <a:pPr algn="ctr"/>
+            <a:endParaRPr lang="de-DE"/>
+          </a:p>
+        </p:txBody>
+      </p:sp>
+      <p:sp>
+        <p:nvSpPr>
+          <p:cNvPr id="130" name="Textfeld 129">
+            <a:extLst>
+              <a:ext uri="{FF2B5EF4-FFF2-40B4-BE49-F238E27FC236}">
+                <a16:creationId xmlns:a16="http://schemas.microsoft.com/office/drawing/2014/main" id="{0E3B88E4-7774-49B3-8AD1-A42DE27470F4}"/>
+              </a:ext>
+            </a:extLst>
+          </p:cNvPr>
+          <p:cNvSpPr txBox="1"/>
+          <p:nvPr/>
+        </p:nvSpPr>
+        <p:spPr>
+          <a:xfrm>
+            <a:off x="5425344" y="4105171"/>
+            <a:ext cx="1132041" cy="215444"/>
+          </a:xfrm>
+          <a:prstGeom prst="rect">
+            <a:avLst/>
+          </a:prstGeom>
+          <a:noFill/>
+        </p:spPr>
+        <p:txBody>
+          <a:bodyPr wrap="none" rtlCol="0">
+            <a:spAutoFit/>
+          </a:bodyPr>
+          <a:lstStyle/>
+          <a:p>
+            <a:r>
+              <a:rPr lang="de-DE" sz="800" dirty="0"/>
+              <a:t>*) optional, </a:t>
+            </a:r>
+            <a:r>
+              <a:rPr lang="de-DE" sz="800" dirty="0" err="1"/>
+              <a:t>default</a:t>
+            </a:r>
+            <a:r>
+              <a:rPr lang="de-DE" sz="800" dirty="0"/>
+              <a:t> = a</a:t>
             </a:r>
           </a:p>
         </p:txBody>

</xml_diff>

<commit_message>
geometry base types: fix parameter name; improve documenation
</commit_message>
<xml_diff>
--- a/documentation/geometryBaseTypes.pptx
+++ b/documentation/geometryBaseTypes.pptx
@@ -3413,8 +3413,8 @@
         </p:nvSpPr>
         <p:spPr>
           <a:xfrm>
-            <a:off x="5468200" y="2292886"/>
-            <a:ext cx="1080000" cy="1080000"/>
+            <a:off x="5347287" y="2299236"/>
+            <a:ext cx="1270763" cy="1080000"/>
           </a:xfrm>
           <a:prstGeom prst="ellipse">
             <a:avLst/>
@@ -3557,8 +3557,8 @@
         </p:nvCxnSpPr>
         <p:spPr>
           <a:xfrm flipV="1">
-            <a:off x="3704663" y="3152036"/>
-            <a:ext cx="710187" cy="139701"/>
+            <a:off x="3704663" y="3291737"/>
+            <a:ext cx="609783" cy="1"/>
           </a:xfrm>
           <a:prstGeom prst="straightConnector1">
             <a:avLst/>
@@ -3604,8 +3604,8 @@
         </p:nvCxnSpPr>
         <p:spPr>
           <a:xfrm flipV="1">
-            <a:off x="3704663" y="2626109"/>
-            <a:ext cx="0" cy="947079"/>
+            <a:off x="3704663" y="2702310"/>
+            <a:ext cx="0" cy="947078"/>
           </a:xfrm>
           <a:prstGeom prst="straightConnector1">
             <a:avLst/>
@@ -3635,55 +3635,8 @@
           </a:fontRef>
         </p:style>
       </p:cxnSp>
-      <p:cxnSp>
-        <p:nvCxnSpPr>
-          <p:cNvPr id="35" name="Gerade Verbindung mit Pfeil 34">
-            <a:extLst>
-              <a:ext uri="{FF2B5EF4-FFF2-40B4-BE49-F238E27FC236}">
-                <a16:creationId xmlns:a16="http://schemas.microsoft.com/office/drawing/2014/main" id="{71472EE1-311A-4864-90B6-5A6BF2B28501}"/>
-              </a:ext>
-            </a:extLst>
-          </p:cNvPr>
-          <p:cNvCxnSpPr>
-            <a:cxnSpLocks/>
-          </p:cNvCxnSpPr>
-          <p:nvPr/>
-        </p:nvCxnSpPr>
-        <p:spPr>
-          <a:xfrm flipH="1" flipV="1">
-            <a:off x="3075615" y="2992299"/>
-            <a:ext cx="629048" cy="299437"/>
-          </a:xfrm>
-          <a:prstGeom prst="straightConnector1">
-            <a:avLst/>
-          </a:prstGeom>
-          <a:ln w="12700">
-            <a:solidFill>
-              <a:schemeClr val="tx1">
-                <a:lumMod val="85000"/>
-                <a:lumOff val="15000"/>
-              </a:schemeClr>
-            </a:solidFill>
-            <a:tailEnd type="triangle" w="sm" len="lg"/>
-          </a:ln>
-        </p:spPr>
-        <p:style>
-          <a:lnRef idx="1">
-            <a:schemeClr val="accent1"/>
-          </a:lnRef>
-          <a:fillRef idx="0">
-            <a:schemeClr val="accent1"/>
-          </a:fillRef>
-          <a:effectRef idx="0">
-            <a:schemeClr val="accent1"/>
-          </a:effectRef>
-          <a:fontRef idx="minor">
-            <a:schemeClr val="tx1"/>
-          </a:fontRef>
-        </p:style>
-      </p:cxnSp>
-      <mc:AlternateContent xmlns:mc="http://schemas.openxmlformats.org/markup-compatibility/2006" xmlns:a14="http://schemas.microsoft.com/office/drawing/2010/main">
-        <mc:Choice Requires="a14">
+      <mc:AlternateContent xmlns:mc="http://schemas.openxmlformats.org/markup-compatibility/2006">
+        <mc:Choice xmlns:a14="http://schemas.microsoft.com/office/drawing/2010/main" Requires="a14">
           <p:sp>
             <p:nvSpPr>
               <p:cNvPr id="36" name="Textfeld 35">
@@ -3698,7 +3651,7 @@
             </p:nvSpPr>
             <p:spPr>
               <a:xfrm>
-                <a:off x="2841652" y="2944887"/>
+                <a:off x="3228065" y="3069921"/>
                 <a:ext cx="333369" cy="153888"/>
               </a:xfrm>
               <a:prstGeom prst="rect">
@@ -3733,7 +3686,7 @@
             </p:txBody>
           </p:sp>
         </mc:Choice>
-        <mc:Fallback xmlns="">
+        <mc:Fallback>
           <p:sp>
             <p:nvSpPr>
               <p:cNvPr id="36" name="Textfeld 35">
@@ -3750,7 +3703,7 @@
             </p:nvSpPr>
             <p:spPr>
               <a:xfrm>
-                <a:off x="2841652" y="2944887"/>
+                <a:off x="3228065" y="3069921"/>
                 <a:ext cx="333369" cy="153888"/>
               </a:xfrm>
               <a:prstGeom prst="rect">
@@ -3759,7 +3712,7 @@
               <a:blipFill>
                 <a:blip r:embed="rId2"/>
                 <a:stretch>
-                  <a:fillRect b="-28000"/>
+                  <a:fillRect b="-24000"/>
                 </a:stretch>
               </a:blipFill>
             </p:spPr>
@@ -3778,8 +3731,8 @@
           </p:sp>
         </mc:Fallback>
       </mc:AlternateContent>
-      <mc:AlternateContent xmlns:mc="http://schemas.openxmlformats.org/markup-compatibility/2006" xmlns:a14="http://schemas.microsoft.com/office/drawing/2010/main">
-        <mc:Choice Requires="a14">
+      <mc:AlternateContent xmlns:mc="http://schemas.openxmlformats.org/markup-compatibility/2006">
+        <mc:Choice xmlns:a14="http://schemas.microsoft.com/office/drawing/2010/main" Requires="a14">
           <p:sp>
             <p:nvSpPr>
               <p:cNvPr id="38" name="Textfeld 37">
@@ -3794,7 +3747,7 @@
             </p:nvSpPr>
             <p:spPr>
               <a:xfrm>
-                <a:off x="4331892" y="3050321"/>
+                <a:off x="4223543" y="3155887"/>
                 <a:ext cx="333369" cy="153888"/>
               </a:xfrm>
               <a:prstGeom prst="rect">
@@ -3829,7 +3782,7 @@
             </p:txBody>
           </p:sp>
         </mc:Choice>
-        <mc:Fallback xmlns="">
+        <mc:Fallback>
           <p:sp>
             <p:nvSpPr>
               <p:cNvPr id="38" name="Textfeld 37">
@@ -3846,7 +3799,7 @@
             </p:nvSpPr>
             <p:spPr>
               <a:xfrm>
-                <a:off x="4331892" y="3050321"/>
+                <a:off x="4223543" y="3155887"/>
                 <a:ext cx="333369" cy="153888"/>
               </a:xfrm>
               <a:prstGeom prst="rect">
@@ -3874,8 +3827,8 @@
           </p:sp>
         </mc:Fallback>
       </mc:AlternateContent>
-      <mc:AlternateContent xmlns:mc="http://schemas.openxmlformats.org/markup-compatibility/2006" xmlns:a14="http://schemas.microsoft.com/office/drawing/2010/main">
-        <mc:Choice Requires="a14">
+      <mc:AlternateContent xmlns:mc="http://schemas.openxmlformats.org/markup-compatibility/2006">
+        <mc:Choice xmlns:a14="http://schemas.microsoft.com/office/drawing/2010/main" Requires="a14">
           <p:sp>
             <p:nvSpPr>
               <p:cNvPr id="39" name="Textfeld 38">
@@ -3890,7 +3843,7 @@
             </p:nvSpPr>
             <p:spPr>
               <a:xfrm>
-                <a:off x="3624344" y="2483258"/>
+                <a:off x="3629156" y="2545746"/>
                 <a:ext cx="333369" cy="153888"/>
               </a:xfrm>
               <a:prstGeom prst="rect">
@@ -3925,7 +3878,7 @@
             </p:txBody>
           </p:sp>
         </mc:Choice>
-        <mc:Fallback xmlns="">
+        <mc:Fallback>
           <p:sp>
             <p:nvSpPr>
               <p:cNvPr id="39" name="Textfeld 38">
@@ -3942,7 +3895,7 @@
             </p:nvSpPr>
             <p:spPr>
               <a:xfrm>
-                <a:off x="3624344" y="2483258"/>
+                <a:off x="3629156" y="2545746"/>
                 <a:ext cx="333369" cy="153888"/>
               </a:xfrm>
               <a:prstGeom prst="rect">
@@ -4457,14 +4410,13 @@
           </p:cNvPr>
           <p:cNvCxnSpPr>
             <a:cxnSpLocks/>
-            <a:stCxn id="8" idx="4"/>
           </p:cNvCxnSpPr>
           <p:nvPr/>
         </p:nvCxnSpPr>
         <p:spPr>
           <a:xfrm>
-            <a:off x="3704663" y="3573188"/>
-            <a:ext cx="551915" cy="121474"/>
+            <a:off x="3706499" y="3653528"/>
+            <a:ext cx="580447" cy="0"/>
           </a:xfrm>
           <a:prstGeom prst="straightConnector1">
             <a:avLst/>
@@ -4545,8 +4497,8 @@
           </a:fontRef>
         </p:style>
       </p:cxnSp>
-      <mc:AlternateContent xmlns:mc="http://schemas.openxmlformats.org/markup-compatibility/2006" xmlns:a14="http://schemas.microsoft.com/office/drawing/2010/main">
-        <mc:Choice Requires="a14">
+      <mc:AlternateContent xmlns:mc="http://schemas.openxmlformats.org/markup-compatibility/2006">
+        <mc:Choice xmlns:a14="http://schemas.microsoft.com/office/drawing/2010/main" Requires="a14">
           <p:sp>
             <p:nvSpPr>
               <p:cNvPr id="69" name="Textfeld 68">
@@ -4561,7 +4513,7 @@
             </p:nvSpPr>
             <p:spPr>
               <a:xfrm>
-                <a:off x="2603471" y="3156342"/>
+                <a:off x="4165191" y="2973806"/>
                 <a:ext cx="618054" cy="246221"/>
               </a:xfrm>
               <a:prstGeom prst="rect">
@@ -4598,7 +4550,7 @@
             </p:txBody>
           </p:sp>
         </mc:Choice>
-        <mc:Fallback xmlns="">
+        <mc:Fallback>
           <p:sp>
             <p:nvSpPr>
               <p:cNvPr id="69" name="Textfeld 68">
@@ -4615,7 +4567,7 @@
             </p:nvSpPr>
             <p:spPr>
               <a:xfrm>
-                <a:off x="2603471" y="3156342"/>
+                <a:off x="4165191" y="2973806"/>
                 <a:ext cx="618054" cy="246221"/>
               </a:xfrm>
               <a:prstGeom prst="rect">
@@ -4657,8 +4609,8 @@
         </p:nvSpPr>
         <p:spPr>
           <a:xfrm>
-            <a:off x="3958483" y="2726702"/>
-            <a:ext cx="902811" cy="246221"/>
+            <a:off x="3981173" y="2781499"/>
+            <a:ext cx="898003" cy="246221"/>
           </a:xfrm>
           <a:prstGeom prst="rect">
             <a:avLst/>
@@ -4672,13 +4624,10 @@
           <a:lstStyle/>
           <a:p>
             <a:r>
-              <a:rPr lang="de-DE" sz="1000" dirty="0" err="1"/>
-              <a:t>upperRadius</a:t>
-            </a:r>
-            <a:r>
-              <a:rPr lang="de-DE" sz="1000" dirty="0"/>
-              <a:t>*</a:t>
-            </a:r>
+              <a:rPr lang="de-DE" sz="1000" i="1" dirty="0" err="1"/>
+              <a:t>upperRadiusX</a:t>
+            </a:r>
+            <a:endParaRPr lang="de-DE" sz="1000" i="1" dirty="0"/>
           </a:p>
         </p:txBody>
       </p:sp>
@@ -4698,7 +4647,7 @@
         </p:nvCxnSpPr>
         <p:spPr>
           <a:xfrm flipV="1">
-            <a:off x="3634481" y="2981084"/>
+            <a:off x="3747614" y="2983500"/>
             <a:ext cx="0" cy="596738"/>
           </a:xfrm>
           <a:prstGeom prst="straightConnector1">
@@ -4746,9 +4695,9 @@
           <p:nvPr/>
         </p:nvCxnSpPr>
         <p:spPr>
-          <a:xfrm>
-            <a:off x="3131524" y="3350268"/>
-            <a:ext cx="505509" cy="59714"/>
+          <a:xfrm flipV="1">
+            <a:off x="3752985" y="3106849"/>
+            <a:ext cx="473726" cy="84101"/>
           </a:xfrm>
           <a:prstGeom prst="line">
             <a:avLst/>
@@ -4823,12 +4772,48 @@
           </a:fontRef>
         </p:style>
       </p:cxnSp>
+      <p:sp>
+        <p:nvSpPr>
+          <p:cNvPr id="79" name="Textfeld 78">
+            <a:extLst>
+              <a:ext uri="{FF2B5EF4-FFF2-40B4-BE49-F238E27FC236}">
+                <a16:creationId xmlns:a16="http://schemas.microsoft.com/office/drawing/2014/main" id="{E8B185EB-9B58-4742-98FC-230E8C210564}"/>
+              </a:ext>
+            </a:extLst>
+          </p:cNvPr>
+          <p:cNvSpPr txBox="1"/>
+          <p:nvPr/>
+        </p:nvSpPr>
+        <p:spPr>
+          <a:xfrm>
+            <a:off x="4086443" y="3719859"/>
+            <a:ext cx="891591" cy="246221"/>
+          </a:xfrm>
+          <a:prstGeom prst="rect">
+            <a:avLst/>
+          </a:prstGeom>
+          <a:noFill/>
+        </p:spPr>
+        <p:txBody>
+          <a:bodyPr wrap="none" rtlCol="0">
+            <a:spAutoFit/>
+          </a:bodyPr>
+          <a:lstStyle/>
+          <a:p>
+            <a:r>
+              <a:rPr lang="de-DE" sz="1000" dirty="0" err="1"/>
+              <a:t>lowerRadiusX</a:t>
+            </a:r>
+            <a:endParaRPr lang="de-DE" sz="1000" dirty="0"/>
+          </a:p>
+        </p:txBody>
+      </p:sp>
       <p:cxnSp>
         <p:nvCxnSpPr>
-          <p:cNvPr id="78" name="Gerader Verbinder 77">
-            <a:extLst>
-              <a:ext uri="{FF2B5EF4-FFF2-40B4-BE49-F238E27FC236}">
-                <a16:creationId xmlns:a16="http://schemas.microsoft.com/office/drawing/2014/main" id="{29A70646-2554-4F35-8CD0-8DAF8EDD69CC}"/>
+          <p:cNvPr id="80" name="Gerade Verbindung mit Pfeil 79">
+            <a:extLst>
+              <a:ext uri="{FF2B5EF4-FFF2-40B4-BE49-F238E27FC236}">
+                <a16:creationId xmlns:a16="http://schemas.microsoft.com/office/drawing/2014/main" id="{5F46D557-9E95-4721-887E-43B55BDDF5E3}"/>
               </a:ext>
             </a:extLst>
           </p:cNvPr>
@@ -4839,90 +4824,8 @@
         </p:nvCxnSpPr>
         <p:spPr>
           <a:xfrm>
-            <a:off x="3587272" y="3576400"/>
-            <a:ext cx="111997" cy="0"/>
-          </a:xfrm>
-          <a:prstGeom prst="line">
-            <a:avLst/>
-          </a:prstGeom>
-          <a:ln>
-            <a:solidFill>
-              <a:schemeClr val="tx1">
-                <a:lumMod val="85000"/>
-                <a:lumOff val="15000"/>
-              </a:schemeClr>
-            </a:solidFill>
-          </a:ln>
-        </p:spPr>
-        <p:style>
-          <a:lnRef idx="1">
-            <a:schemeClr val="accent1"/>
-          </a:lnRef>
-          <a:fillRef idx="0">
-            <a:schemeClr val="accent1"/>
-          </a:fillRef>
-          <a:effectRef idx="0">
-            <a:schemeClr val="accent1"/>
-          </a:effectRef>
-          <a:fontRef idx="minor">
-            <a:schemeClr val="tx1"/>
-          </a:fontRef>
-        </p:style>
-      </p:cxnSp>
-      <p:sp>
-        <p:nvSpPr>
-          <p:cNvPr id="79" name="Textfeld 78">
-            <a:extLst>
-              <a:ext uri="{FF2B5EF4-FFF2-40B4-BE49-F238E27FC236}">
-                <a16:creationId xmlns:a16="http://schemas.microsoft.com/office/drawing/2014/main" id="{E8B185EB-9B58-4742-98FC-230E8C210564}"/>
-              </a:ext>
-            </a:extLst>
-          </p:cNvPr>
-          <p:cNvSpPr txBox="1"/>
-          <p:nvPr/>
-        </p:nvSpPr>
-        <p:spPr>
-          <a:xfrm>
-            <a:off x="4086443" y="3719859"/>
-            <a:ext cx="824265" cy="246221"/>
-          </a:xfrm>
-          <a:prstGeom prst="rect">
-            <a:avLst/>
-          </a:prstGeom>
-          <a:noFill/>
-        </p:spPr>
-        <p:txBody>
-          <a:bodyPr wrap="none" rtlCol="0">
-            <a:spAutoFit/>
-          </a:bodyPr>
-          <a:lstStyle/>
-          <a:p>
-            <a:r>
-              <a:rPr lang="de-DE" sz="1000" dirty="0" err="1"/>
-              <a:t>lowerRadius</a:t>
-            </a:r>
-            <a:endParaRPr lang="de-DE" sz="1000" dirty="0"/>
-          </a:p>
-        </p:txBody>
-      </p:sp>
-      <p:cxnSp>
-        <p:nvCxnSpPr>
-          <p:cNvPr id="80" name="Gerade Verbindung mit Pfeil 79">
-            <a:extLst>
-              <a:ext uri="{FF2B5EF4-FFF2-40B4-BE49-F238E27FC236}">
-                <a16:creationId xmlns:a16="http://schemas.microsoft.com/office/drawing/2014/main" id="{5F46D557-9E95-4721-887E-43B55BDDF5E3}"/>
-              </a:ext>
-            </a:extLst>
-          </p:cNvPr>
-          <p:cNvCxnSpPr>
-            <a:cxnSpLocks/>
-          </p:cNvCxnSpPr>
-          <p:nvPr/>
-        </p:nvCxnSpPr>
-        <p:spPr>
-          <a:xfrm>
-            <a:off x="5999922" y="3393887"/>
-            <a:ext cx="464698" cy="224231"/>
+            <a:off x="5987222" y="3384362"/>
+            <a:ext cx="232632" cy="114488"/>
           </a:xfrm>
           <a:prstGeom prst="straightConnector1">
             <a:avLst/>
@@ -4968,8 +4871,8 @@
         </p:nvSpPr>
         <p:spPr>
           <a:xfrm>
-            <a:off x="6217215" y="3345140"/>
-            <a:ext cx="316112" cy="246221"/>
+            <a:off x="6139506" y="3471366"/>
+            <a:ext cx="566181" cy="246221"/>
           </a:xfrm>
           <a:prstGeom prst="rect">
             <a:avLst/>
@@ -4983,9 +4886,10 @@
           <a:lstStyle/>
           <a:p>
             <a:r>
-              <a:rPr lang="de-DE" sz="1000" dirty="0"/>
-              <a:t>b*</a:t>
-            </a:r>
+              <a:rPr lang="de-DE" sz="1000" i="1" dirty="0" err="1"/>
+              <a:t>radiusY</a:t>
+            </a:r>
+            <a:endParaRPr lang="de-DE" sz="1000" i="1" dirty="0"/>
           </a:p>
         </p:txBody>
       </p:sp>
@@ -5961,7 +5865,7 @@
         </p:nvSpPr>
         <p:spPr>
           <a:xfrm>
-            <a:off x="5675927" y="1789586"/>
+            <a:off x="5591292" y="1789586"/>
             <a:ext cx="792909" cy="307777"/>
           </a:xfrm>
           <a:prstGeom prst="rect">
@@ -6165,8 +6069,8 @@
           </a:fontRef>
         </p:style>
       </p:cxnSp>
-      <mc:AlternateContent xmlns:mc="http://schemas.openxmlformats.org/markup-compatibility/2006" xmlns:a14="http://schemas.microsoft.com/office/drawing/2010/main">
-        <mc:Choice Requires="a14">
+      <mc:AlternateContent xmlns:mc="http://schemas.openxmlformats.org/markup-compatibility/2006">
+        <mc:Choice xmlns:a14="http://schemas.microsoft.com/office/drawing/2010/main" Requires="a14">
           <p:sp>
             <p:nvSpPr>
               <p:cNvPr id="84" name="Textfeld 83">
@@ -6180,8 +6084,8 @@
               <p:nvPr/>
             </p:nvSpPr>
             <p:spPr>
-              <a:xfrm>
-                <a:off x="1848576" y="3714294"/>
+              <a:xfrm rot="21076678">
+                <a:off x="1724851" y="3714294"/>
                 <a:ext cx="668404" cy="246221"/>
               </a:xfrm>
               <a:prstGeom prst="rect">
@@ -6198,10 +6102,25 @@
                 <a14:m>
                   <m:oMath xmlns:m="http://schemas.openxmlformats.org/officeDocument/2006/math">
                     <m:r>
+                      <m:rPr>
+                        <m:sty m:val="p"/>
+                      </m:rPr>
+                      <a:rPr lang="de-DE" sz="1000" b="0" i="0" smtClean="0">
+                        <a:latin typeface="Cambria Math" panose="02040503050406030204" pitchFamily="18" charset="0"/>
+                      </a:rPr>
+                      <m:t>length</m:t>
+                    </m:r>
+                    <m:r>
                       <a:rPr lang="de-DE" sz="1000" b="0" i="1" smtClean="0">
                         <a:latin typeface="Cambria Math" panose="02040503050406030204" pitchFamily="18" charset="0"/>
                       </a:rPr>
-                      <m:t>𝑎</m:t>
+                      <m:t> </m:t>
+                    </m:r>
+                    <m:r>
+                      <a:rPr lang="de-DE" sz="1000" b="0" i="1" smtClean="0">
+                        <a:latin typeface="Cambria Math" panose="02040503050406030204" pitchFamily="18" charset="0"/>
+                      </a:rPr>
+                      <m:t>𝑙</m:t>
                     </m:r>
                   </m:oMath>
                 </a14:m>
@@ -6213,7 +6132,7 @@
             </p:txBody>
           </p:sp>
         </mc:Choice>
-        <mc:Fallback xmlns="">
+        <mc:Fallback>
           <p:sp>
             <p:nvSpPr>
               <p:cNvPr id="84" name="Textfeld 83">
@@ -6229,8 +6148,8 @@
               <p:nvPr/>
             </p:nvSpPr>
             <p:spPr>
-              <a:xfrm>
-                <a:off x="1848576" y="3714294"/>
+              <a:xfrm rot="21076678">
+                <a:off x="1724851" y="3714294"/>
                 <a:ext cx="668404" cy="246221"/>
               </a:xfrm>
               <a:prstGeom prst="rect">
@@ -6258,8 +6177,8 @@
           </p:sp>
         </mc:Fallback>
       </mc:AlternateContent>
-      <mc:AlternateContent xmlns:mc="http://schemas.openxmlformats.org/markup-compatibility/2006" xmlns:a14="http://schemas.microsoft.com/office/drawing/2010/main">
-        <mc:Choice Requires="a14">
+      <mc:AlternateContent xmlns:mc="http://schemas.openxmlformats.org/markup-compatibility/2006">
+        <mc:Choice xmlns:a14="http://schemas.microsoft.com/office/drawing/2010/main" Requires="a14">
           <p:sp>
             <p:nvSpPr>
               <p:cNvPr id="95" name="Textfeld 94">
@@ -6274,7 +6193,7 @@
             </p:nvSpPr>
             <p:spPr>
               <a:xfrm>
-                <a:off x="580000" y="3180422"/>
+                <a:off x="284968" y="3207706"/>
                 <a:ext cx="317720" cy="246221"/>
               </a:xfrm>
               <a:prstGeom prst="rect">
@@ -6296,10 +6215,25 @@
                     </m:oMathParaPr>
                     <m:oMath xmlns:m="http://schemas.openxmlformats.org/officeDocument/2006/math">
                       <m:r>
+                        <m:rPr>
+                          <m:sty m:val="p"/>
+                        </m:rPr>
+                        <a:rPr lang="de-DE" sz="1000" b="0" i="0" dirty="0" smtClean="0">
+                          <a:latin typeface="Cambria Math" panose="02040503050406030204" pitchFamily="18" charset="0"/>
+                        </a:rPr>
+                        <m:t>height</m:t>
+                      </m:r>
+                      <m:r>
+                        <a:rPr lang="de-DE" sz="1000" b="0" i="0" dirty="0" smtClean="0">
+                          <a:latin typeface="Cambria Math" panose="02040503050406030204" pitchFamily="18" charset="0"/>
+                        </a:rPr>
+                        <m:t> </m:t>
+                      </m:r>
+                      <m:r>
                         <a:rPr lang="de-DE" sz="1000" b="0" i="1" dirty="0" smtClean="0">
                           <a:latin typeface="Cambria Math" panose="02040503050406030204" pitchFamily="18" charset="0"/>
                         </a:rPr>
-                        <m:t>𝑐</m:t>
+                        <m:t>h</m:t>
                       </m:r>
                     </m:oMath>
                   </m:oMathPara>
@@ -6309,7 +6243,7 @@
             </p:txBody>
           </p:sp>
         </mc:Choice>
-        <mc:Fallback xmlns="">
+        <mc:Fallback>
           <p:sp>
             <p:nvSpPr>
               <p:cNvPr id="95" name="Textfeld 94">
@@ -6326,7 +6260,7 @@
             </p:nvSpPr>
             <p:spPr>
               <a:xfrm>
-                <a:off x="580000" y="3180422"/>
+                <a:off x="284968" y="3207706"/>
                 <a:ext cx="317720" cy="246221"/>
               </a:xfrm>
               <a:prstGeom prst="rect">
@@ -6335,7 +6269,7 @@
               <a:blipFill>
                 <a:blip r:embed="rId15"/>
                 <a:stretch>
-                  <a:fillRect/>
+                  <a:fillRect r="-84615" b="-2439"/>
                 </a:stretch>
               </a:blipFill>
             </p:spPr>
@@ -6354,8 +6288,8 @@
           </p:sp>
         </mc:Fallback>
       </mc:AlternateContent>
-      <mc:AlternateContent xmlns:mc="http://schemas.openxmlformats.org/markup-compatibility/2006" xmlns:a14="http://schemas.microsoft.com/office/drawing/2010/main">
-        <mc:Choice Requires="a14">
+      <mc:AlternateContent xmlns:mc="http://schemas.openxmlformats.org/markup-compatibility/2006">
+        <mc:Choice xmlns:a14="http://schemas.microsoft.com/office/drawing/2010/main" Requires="a14">
           <p:sp>
             <p:nvSpPr>
               <p:cNvPr id="96" name="Textfeld 95">
@@ -6370,7 +6304,7 @@
             </p:nvSpPr>
             <p:spPr>
               <a:xfrm>
-                <a:off x="597872" y="3658537"/>
+                <a:off x="445734" y="3658967"/>
                 <a:ext cx="649745" cy="246221"/>
               </a:xfrm>
               <a:prstGeom prst="rect">
@@ -6392,10 +6326,25 @@
                     </m:oMathParaPr>
                     <m:oMath xmlns:m="http://schemas.openxmlformats.org/officeDocument/2006/math">
                       <m:r>
+                        <m:rPr>
+                          <m:sty m:val="p"/>
+                        </m:rPr>
+                        <a:rPr lang="de-DE" sz="1000" b="0" i="0" smtClean="0">
+                          <a:latin typeface="Cambria Math" panose="02040503050406030204" pitchFamily="18" charset="0"/>
+                        </a:rPr>
+                        <m:t>width</m:t>
+                      </m:r>
+                      <m:r>
                         <a:rPr lang="de-DE" sz="1000" b="0" i="1" smtClean="0">
                           <a:latin typeface="Cambria Math" panose="02040503050406030204" pitchFamily="18" charset="0"/>
                         </a:rPr>
-                        <m:t>𝑏</m:t>
+                        <m:t> </m:t>
+                      </m:r>
+                      <m:r>
+                        <a:rPr lang="de-DE" sz="1000" b="0" i="1" smtClean="0">
+                          <a:latin typeface="Cambria Math" panose="02040503050406030204" pitchFamily="18" charset="0"/>
+                        </a:rPr>
+                        <m:t>𝑤</m:t>
                       </m:r>
                     </m:oMath>
                   </m:oMathPara>
@@ -6405,7 +6354,7 @@
             </p:txBody>
           </p:sp>
         </mc:Choice>
-        <mc:Fallback xmlns="">
+        <mc:Fallback>
           <p:sp>
             <p:nvSpPr>
               <p:cNvPr id="96" name="Textfeld 95">
@@ -6422,7 +6371,7 @@
             </p:nvSpPr>
             <p:spPr>
               <a:xfrm>
-                <a:off x="597872" y="3658537"/>
+                <a:off x="445734" y="3658967"/>
                 <a:ext cx="649745" cy="246221"/>
               </a:xfrm>
               <a:prstGeom prst="rect">
@@ -7248,8 +7197,8 @@
           </mc:Fallback>
         </mc:AlternateContent>
       </p:grpSp>
-      <mc:AlternateContent xmlns:mc="http://schemas.openxmlformats.org/markup-compatibility/2006" xmlns:a14="http://schemas.microsoft.com/office/drawing/2010/main">
-        <mc:Choice Requires="a14">
+      <mc:AlternateContent xmlns:mc="http://schemas.openxmlformats.org/markup-compatibility/2006">
+        <mc:Choice xmlns:a14="http://schemas.microsoft.com/office/drawing/2010/main" Requires="a14">
           <p:sp>
             <p:nvSpPr>
               <p:cNvPr id="116" name="Textfeld 115">
@@ -7290,7 +7239,7 @@
                       <a:rPr lang="de-DE" sz="800" b="0" i="1" smtClean="0">
                         <a:latin typeface="Cambria Math" panose="02040503050406030204" pitchFamily="18" charset="0"/>
                       </a:rPr>
-                      <m:t>𝑎</m:t>
+                      <m:t>𝑙</m:t>
                     </m:r>
                   </m:oMath>
                 </a14:m>
@@ -7302,7 +7251,7 @@
             </p:txBody>
           </p:sp>
         </mc:Choice>
-        <mc:Fallback xmlns="">
+        <mc:Fallback>
           <p:sp>
             <p:nvSpPr>
               <p:cNvPr id="116" name="Textfeld 115">
@@ -7347,8 +7296,8 @@
           </p:sp>
         </mc:Fallback>
       </mc:AlternateContent>
-      <mc:AlternateContent xmlns:mc="http://schemas.openxmlformats.org/markup-compatibility/2006" xmlns:a14="http://schemas.microsoft.com/office/drawing/2010/main">
-        <mc:Choice Requires="a14">
+      <mc:AlternateContent xmlns:mc="http://schemas.openxmlformats.org/markup-compatibility/2006">
+        <mc:Choice xmlns:a14="http://schemas.microsoft.com/office/drawing/2010/main" Requires="a14">
           <p:sp>
             <p:nvSpPr>
               <p:cNvPr id="117" name="Textfeld 116">
@@ -7389,7 +7338,7 @@
                       <a:rPr lang="de-DE" sz="800" b="0" i="1" smtClean="0">
                         <a:latin typeface="Cambria Math" panose="02040503050406030204" pitchFamily="18" charset="0"/>
                       </a:rPr>
-                      <m:t>𝑏</m:t>
+                      <m:t>𝑤</m:t>
                     </m:r>
                   </m:oMath>
                 </a14:m>
@@ -7401,7 +7350,7 @@
             </p:txBody>
           </p:sp>
         </mc:Choice>
-        <mc:Fallback xmlns="">
+        <mc:Fallback>
           <p:sp>
             <p:nvSpPr>
               <p:cNvPr id="117" name="Textfeld 116">
@@ -7446,8 +7395,8 @@
           </p:sp>
         </mc:Fallback>
       </mc:AlternateContent>
-      <mc:AlternateContent xmlns:mc="http://schemas.openxmlformats.org/markup-compatibility/2006" xmlns:a14="http://schemas.microsoft.com/office/drawing/2010/main">
-        <mc:Choice Requires="a14">
+      <mc:AlternateContent xmlns:mc="http://schemas.openxmlformats.org/markup-compatibility/2006">
+        <mc:Choice xmlns:a14="http://schemas.microsoft.com/office/drawing/2010/main" Requires="a14">
           <p:sp>
             <p:nvSpPr>
               <p:cNvPr id="119" name="Textfeld 118">
@@ -7488,7 +7437,7 @@
                       <a:rPr lang="de-DE" sz="800" b="0" i="1" smtClean="0">
                         <a:latin typeface="Cambria Math" panose="02040503050406030204" pitchFamily="18" charset="0"/>
                       </a:rPr>
-                      <m:t>𝑐</m:t>
+                      <m:t>h</m:t>
                     </m:r>
                   </m:oMath>
                 </a14:m>
@@ -7500,7 +7449,7 @@
             </p:txBody>
           </p:sp>
         </mc:Choice>
-        <mc:Fallback xmlns="">
+        <mc:Fallback>
           <p:sp>
             <p:nvSpPr>
               <p:cNvPr id="119" name="Textfeld 118">
@@ -7725,7 +7674,7 @@
         </p:nvCxnSpPr>
         <p:spPr>
           <a:xfrm>
-            <a:off x="3735031" y="3572671"/>
+            <a:off x="3702608" y="3577807"/>
             <a:ext cx="111997" cy="0"/>
           </a:xfrm>
           <a:prstGeom prst="line">
@@ -7755,8 +7704,8 @@
           </a:fontRef>
         </p:style>
       </p:cxnSp>
-      <mc:AlternateContent xmlns:mc="http://schemas.openxmlformats.org/markup-compatibility/2006" xmlns:a14="http://schemas.microsoft.com/office/drawing/2010/main">
-        <mc:Choice Requires="a14">
+      <mc:AlternateContent xmlns:mc="http://schemas.openxmlformats.org/markup-compatibility/2006">
+        <mc:Choice xmlns:a14="http://schemas.microsoft.com/office/drawing/2010/main" Requires="a14">
           <p:sp>
             <p:nvSpPr>
               <p:cNvPr id="129" name="Textfeld 128">
@@ -7771,7 +7720,7 @@
             </p:nvSpPr>
             <p:spPr>
               <a:xfrm>
-                <a:off x="3736037" y="3324925"/>
+                <a:off x="3745333" y="3330101"/>
                 <a:ext cx="372899" cy="215444"/>
               </a:xfrm>
               <a:prstGeom prst="rect">
@@ -7809,7 +7758,7 @@
             </p:txBody>
           </p:sp>
         </mc:Choice>
-        <mc:Fallback xmlns="">
+        <mc:Fallback>
           <p:sp>
             <p:nvSpPr>
               <p:cNvPr id="129" name="Textfeld 128">
@@ -7826,7 +7775,7 @@
             </p:nvSpPr>
             <p:spPr>
               <a:xfrm>
-                <a:off x="3736037" y="3324925"/>
+                <a:off x="3745333" y="3330101"/>
                 <a:ext cx="372899" cy="215444"/>
               </a:xfrm>
               <a:prstGeom prst="rect">
@@ -7868,8 +7817,8 @@
         </p:nvSpPr>
         <p:spPr>
           <a:xfrm>
-            <a:off x="3357679" y="4112751"/>
-            <a:ext cx="1600118" cy="215444"/>
+            <a:off x="2856953" y="4112751"/>
+            <a:ext cx="1800493" cy="215444"/>
           </a:xfrm>
           <a:prstGeom prst="rect">
             <a:avLst/>
@@ -7883,8 +7832,12 @@
           <a:lstStyle/>
           <a:p>
             <a:r>
+              <a:rPr lang="de-DE" sz="800" i="1" dirty="0" err="1"/>
+              <a:t>italic</a:t>
+            </a:r>
+            <a:r>
               <a:rPr lang="de-DE" sz="800" dirty="0"/>
-              <a:t>*) optional, </a:t>
+              <a:t>: optional, </a:t>
             </a:r>
             <a:r>
               <a:rPr lang="de-DE" sz="800" dirty="0" err="1"/>
@@ -7896,7 +7849,7 @@
             </a:r>
             <a:r>
               <a:rPr lang="de-DE" sz="800" dirty="0" err="1"/>
-              <a:t>lowerRadius</a:t>
+              <a:t>lowerRadiusX</a:t>
             </a:r>
             <a:endParaRPr lang="de-DE" sz="800" dirty="0"/>
           </a:p>
@@ -8635,7 +8588,7 @@
         </p:nvSpPr>
         <p:spPr>
           <a:xfrm>
-            <a:off x="920146" y="3968479"/>
+            <a:off x="883600" y="3973624"/>
             <a:ext cx="1116011" cy="215444"/>
           </a:xfrm>
           <a:prstGeom prst="rect">
@@ -8680,8 +8633,8 @@
         </p:nvCxnSpPr>
         <p:spPr>
           <a:xfrm flipH="1">
-            <a:off x="5475584" y="3383203"/>
-            <a:ext cx="517536" cy="85048"/>
+            <a:off x="5394922" y="3389553"/>
+            <a:ext cx="579148" cy="125172"/>
           </a:xfrm>
           <a:prstGeom prst="straightConnector1">
             <a:avLst/>
@@ -8727,8 +8680,8 @@
         </p:nvSpPr>
         <p:spPr>
           <a:xfrm>
-            <a:off x="5589044" y="3379040"/>
-            <a:ext cx="251992" cy="246221"/>
+            <a:off x="4900121" y="3458023"/>
+            <a:ext cx="570990" cy="246221"/>
           </a:xfrm>
           <a:prstGeom prst="rect">
             <a:avLst/>
@@ -8736,15 +8689,16 @@
           <a:noFill/>
         </p:spPr>
         <p:txBody>
-          <a:bodyPr wrap="none" rtlCol="0">
+          <a:bodyPr wrap="square" rtlCol="0">
             <a:spAutoFit/>
           </a:bodyPr>
           <a:lstStyle/>
           <a:p>
             <a:r>
-              <a:rPr lang="de-DE" sz="1000" dirty="0"/>
-              <a:t>a</a:t>
-            </a:r>
+              <a:rPr lang="de-DE" sz="1000" dirty="0" err="1"/>
+              <a:t>radiusX</a:t>
+            </a:r>
+            <a:endParaRPr lang="de-DE" sz="1000" dirty="0"/>
           </a:p>
         </p:txBody>
       </p:sp>
@@ -8812,8 +8766,8 @@
         </p:nvSpPr>
         <p:spPr>
           <a:xfrm>
-            <a:off x="5938211" y="3612667"/>
-            <a:ext cx="303288" cy="246221"/>
+            <a:off x="5873445" y="3861421"/>
+            <a:ext cx="562975" cy="246221"/>
           </a:xfrm>
           <a:prstGeom prst="rect">
             <a:avLst/>
@@ -8827,9 +8781,10 @@
           <a:lstStyle/>
           <a:p>
             <a:r>
-              <a:rPr lang="de-DE" sz="1000" dirty="0"/>
-              <a:t>c*</a:t>
-            </a:r>
+              <a:rPr lang="de-DE" sz="1000" i="1" dirty="0" err="1"/>
+              <a:t>radiusZ</a:t>
+            </a:r>
+            <a:endParaRPr lang="de-DE" sz="1000" i="1" dirty="0"/>
           </a:p>
         </p:txBody>
       </p:sp>
@@ -8917,7 +8872,7 @@
         <p:spPr>
           <a:xfrm>
             <a:off x="5425344" y="4105171"/>
-            <a:ext cx="1132041" cy="215444"/>
+            <a:ext cx="1279517" cy="215444"/>
           </a:xfrm>
           <a:prstGeom prst="rect">
             <a:avLst/>
@@ -8931,8 +8886,12 @@
           <a:lstStyle/>
           <a:p>
             <a:r>
+              <a:rPr lang="de-DE" sz="800" i="1" dirty="0" err="1"/>
+              <a:t>italic</a:t>
+            </a:r>
+            <a:r>
               <a:rPr lang="de-DE" sz="800" dirty="0"/>
-              <a:t>*) optional, </a:t>
+              <a:t>: optional, </a:t>
             </a:r>
             <a:r>
               <a:rPr lang="de-DE" sz="800" dirty="0" err="1"/>
@@ -8942,6 +8901,475 @@
               <a:rPr lang="de-DE" sz="800" dirty="0"/>
               <a:t> = a</a:t>
             </a:r>
+          </a:p>
+        </p:txBody>
+      </p:sp>
+      <p:cxnSp>
+        <p:nvCxnSpPr>
+          <p:cNvPr id="132" name="Gerade Verbindung mit Pfeil 131">
+            <a:extLst>
+              <a:ext uri="{FF2B5EF4-FFF2-40B4-BE49-F238E27FC236}">
+                <a16:creationId xmlns:a16="http://schemas.microsoft.com/office/drawing/2014/main" id="{18A43B16-E7F6-418E-9E24-FF125F9E36C7}"/>
+              </a:ext>
+            </a:extLst>
+          </p:cNvPr>
+          <p:cNvCxnSpPr>
+            <a:cxnSpLocks/>
+          </p:cNvCxnSpPr>
+          <p:nvPr/>
+        </p:nvCxnSpPr>
+        <p:spPr>
+          <a:xfrm flipH="1" flipV="1">
+            <a:off x="3529013" y="3504576"/>
+            <a:ext cx="177223" cy="148943"/>
+          </a:xfrm>
+          <a:prstGeom prst="straightConnector1">
+            <a:avLst/>
+          </a:prstGeom>
+          <a:ln w="9525">
+            <a:solidFill>
+              <a:schemeClr val="tx1">
+                <a:lumMod val="85000"/>
+                <a:lumOff val="15000"/>
+              </a:schemeClr>
+            </a:solidFill>
+            <a:prstDash val="sysDash"/>
+            <a:headEnd type="none" w="sm" len="sm"/>
+            <a:tailEnd type="triangle" w="sm" len="sm"/>
+          </a:ln>
+        </p:spPr>
+        <p:style>
+          <a:lnRef idx="1">
+            <a:schemeClr val="accent1"/>
+          </a:lnRef>
+          <a:fillRef idx="0">
+            <a:schemeClr val="accent1"/>
+          </a:fillRef>
+          <a:effectRef idx="0">
+            <a:schemeClr val="accent1"/>
+          </a:effectRef>
+          <a:fontRef idx="minor">
+            <a:schemeClr val="tx1"/>
+          </a:fontRef>
+        </p:style>
+      </p:cxnSp>
+      <p:sp>
+        <p:nvSpPr>
+          <p:cNvPr id="133" name="Textfeld 132">
+            <a:extLst>
+              <a:ext uri="{FF2B5EF4-FFF2-40B4-BE49-F238E27FC236}">
+                <a16:creationId xmlns:a16="http://schemas.microsoft.com/office/drawing/2014/main" id="{21AF3ABE-0033-4106-A26F-3741BB05841B}"/>
+              </a:ext>
+            </a:extLst>
+          </p:cNvPr>
+          <p:cNvSpPr txBox="1"/>
+          <p:nvPr/>
+        </p:nvSpPr>
+        <p:spPr>
+          <a:xfrm>
+            <a:off x="2745576" y="3297493"/>
+            <a:ext cx="886781" cy="246221"/>
+          </a:xfrm>
+          <a:prstGeom prst="rect">
+            <a:avLst/>
+          </a:prstGeom>
+          <a:noFill/>
+        </p:spPr>
+        <p:txBody>
+          <a:bodyPr wrap="none" rtlCol="0">
+            <a:spAutoFit/>
+          </a:bodyPr>
+          <a:lstStyle/>
+          <a:p>
+            <a:r>
+              <a:rPr lang="de-DE" sz="1000" i="1" dirty="0" err="1"/>
+              <a:t>lowerRadiusY</a:t>
+            </a:r>
+            <a:endParaRPr lang="de-DE" sz="1000" i="1" dirty="0"/>
+          </a:p>
+        </p:txBody>
+      </p:sp>
+      <p:cxnSp>
+        <p:nvCxnSpPr>
+          <p:cNvPr id="134" name="Gerade Verbindung mit Pfeil 133">
+            <a:extLst>
+              <a:ext uri="{FF2B5EF4-FFF2-40B4-BE49-F238E27FC236}">
+                <a16:creationId xmlns:a16="http://schemas.microsoft.com/office/drawing/2014/main" id="{01BC262C-4D1C-4DA0-BC11-B066D006BDA1}"/>
+              </a:ext>
+            </a:extLst>
+          </p:cNvPr>
+          <p:cNvCxnSpPr>
+            <a:cxnSpLocks/>
+          </p:cNvCxnSpPr>
+          <p:nvPr/>
+        </p:nvCxnSpPr>
+        <p:spPr>
+          <a:xfrm flipH="1" flipV="1">
+            <a:off x="3621161" y="2891036"/>
+            <a:ext cx="79832" cy="79614"/>
+          </a:xfrm>
+          <a:prstGeom prst="straightConnector1">
+            <a:avLst/>
+          </a:prstGeom>
+          <a:ln w="9525">
+            <a:solidFill>
+              <a:schemeClr val="tx1">
+                <a:lumMod val="85000"/>
+                <a:lumOff val="15000"/>
+              </a:schemeClr>
+            </a:solidFill>
+            <a:prstDash val="sysDash"/>
+            <a:headEnd type="none" w="sm" len="sm"/>
+            <a:tailEnd type="triangle" w="sm" len="sm"/>
+          </a:ln>
+        </p:spPr>
+        <p:style>
+          <a:lnRef idx="1">
+            <a:schemeClr val="accent1"/>
+          </a:lnRef>
+          <a:fillRef idx="0">
+            <a:schemeClr val="accent1"/>
+          </a:fillRef>
+          <a:effectRef idx="0">
+            <a:schemeClr val="accent1"/>
+          </a:effectRef>
+          <a:fontRef idx="minor">
+            <a:schemeClr val="tx1"/>
+          </a:fontRef>
+        </p:style>
+      </p:cxnSp>
+      <p:sp>
+        <p:nvSpPr>
+          <p:cNvPr id="135" name="Textfeld 134">
+            <a:extLst>
+              <a:ext uri="{FF2B5EF4-FFF2-40B4-BE49-F238E27FC236}">
+                <a16:creationId xmlns:a16="http://schemas.microsoft.com/office/drawing/2014/main" id="{296E9209-922E-44E8-894F-35FFF4E818ED}"/>
+              </a:ext>
+            </a:extLst>
+          </p:cNvPr>
+          <p:cNvSpPr txBox="1"/>
+          <p:nvPr/>
+        </p:nvSpPr>
+        <p:spPr>
+          <a:xfrm>
+            <a:off x="2803753" y="2658389"/>
+            <a:ext cx="893193" cy="246221"/>
+          </a:xfrm>
+          <a:prstGeom prst="rect">
+            <a:avLst/>
+          </a:prstGeom>
+          <a:noFill/>
+        </p:spPr>
+        <p:txBody>
+          <a:bodyPr wrap="none" rtlCol="0">
+            <a:spAutoFit/>
+          </a:bodyPr>
+          <a:lstStyle/>
+          <a:p>
+            <a:r>
+              <a:rPr lang="de-DE" sz="1000" i="1" dirty="0" err="1"/>
+              <a:t>upperRadiusY</a:t>
+            </a:r>
+            <a:endParaRPr lang="de-DE" sz="1000" i="1" dirty="0"/>
+          </a:p>
+        </p:txBody>
+      </p:sp>
+      <p:cxnSp>
+        <p:nvCxnSpPr>
+          <p:cNvPr id="137" name="Gerade Verbindung mit Pfeil 136">
+            <a:extLst>
+              <a:ext uri="{FF2B5EF4-FFF2-40B4-BE49-F238E27FC236}">
+                <a16:creationId xmlns:a16="http://schemas.microsoft.com/office/drawing/2014/main" id="{00CE2FFC-E093-4FEB-A7CB-EB6BC624F79C}"/>
+              </a:ext>
+            </a:extLst>
+          </p:cNvPr>
+          <p:cNvCxnSpPr>
+            <a:cxnSpLocks/>
+          </p:cNvCxnSpPr>
+          <p:nvPr/>
+        </p:nvCxnSpPr>
+        <p:spPr>
+          <a:xfrm flipH="1" flipV="1">
+            <a:off x="3403586" y="3072997"/>
+            <a:ext cx="298979" cy="218087"/>
+          </a:xfrm>
+          <a:prstGeom prst="straightConnector1">
+            <a:avLst/>
+          </a:prstGeom>
+          <a:ln w="12700">
+            <a:solidFill>
+              <a:schemeClr val="tx1">
+                <a:lumMod val="85000"/>
+                <a:lumOff val="15000"/>
+              </a:schemeClr>
+            </a:solidFill>
+            <a:tailEnd type="triangle" w="sm" len="lg"/>
+          </a:ln>
+        </p:spPr>
+        <p:style>
+          <a:lnRef idx="1">
+            <a:schemeClr val="accent1"/>
+          </a:lnRef>
+          <a:fillRef idx="0">
+            <a:schemeClr val="accent1"/>
+          </a:fillRef>
+          <a:effectRef idx="0">
+            <a:schemeClr val="accent1"/>
+          </a:effectRef>
+          <a:fontRef idx="minor">
+            <a:schemeClr val="tx1"/>
+          </a:fontRef>
+        </p:style>
+      </p:cxnSp>
+      <p:sp>
+        <p:nvSpPr>
+          <p:cNvPr id="138" name="Textfeld 137">
+            <a:extLst>
+              <a:ext uri="{FF2B5EF4-FFF2-40B4-BE49-F238E27FC236}">
+                <a16:creationId xmlns:a16="http://schemas.microsoft.com/office/drawing/2014/main" id="{3480E126-E2E9-4A61-9915-76253302E1C0}"/>
+              </a:ext>
+            </a:extLst>
+          </p:cNvPr>
+          <p:cNvSpPr txBox="1"/>
+          <p:nvPr/>
+        </p:nvSpPr>
+        <p:spPr>
+          <a:xfrm>
+            <a:off x="8310290" y="4342811"/>
+            <a:ext cx="1252810" cy="707886"/>
+          </a:xfrm>
+          <a:prstGeom prst="rect">
+            <a:avLst/>
+          </a:prstGeom>
+          <a:noFill/>
+        </p:spPr>
+        <p:txBody>
+          <a:bodyPr wrap="square" rtlCol="0">
+            <a:spAutoFit/>
+          </a:bodyPr>
+          <a:lstStyle/>
+          <a:p>
+            <a:r>
+              <a:rPr lang="de-DE" sz="800" i="1" dirty="0"/>
+              <a:t>Note: </a:t>
+            </a:r>
+            <a:r>
+              <a:rPr lang="en-US" sz="800" i="1" dirty="0"/>
+              <a:t>A bounding box must not be interpreted as a solid body and therefore cannot be used to determine the mass.</a:t>
+            </a:r>
+            <a:endParaRPr lang="de-DE" sz="800" dirty="0"/>
+          </a:p>
+        </p:txBody>
+      </p:sp>
+      <p:sp>
+        <p:nvSpPr>
+          <p:cNvPr id="72" name="Ellipse 71">
+            <a:extLst>
+              <a:ext uri="{FF2B5EF4-FFF2-40B4-BE49-F238E27FC236}">
+                <a16:creationId xmlns:a16="http://schemas.microsoft.com/office/drawing/2014/main" id="{88638F8D-437D-4D3F-B35A-2EE9CB9036A6}"/>
+              </a:ext>
+            </a:extLst>
+          </p:cNvPr>
+          <p:cNvSpPr/>
+          <p:nvPr/>
+        </p:nvSpPr>
+        <p:spPr>
+          <a:xfrm>
+            <a:off x="3123560" y="3488942"/>
+            <a:ext cx="1161291" cy="337083"/>
+          </a:xfrm>
+          <a:prstGeom prst="ellipse">
+            <a:avLst/>
+          </a:prstGeom>
+          <a:noFill/>
+          <a:ln w="9525">
+            <a:solidFill>
+              <a:srgbClr val="262626"/>
+            </a:solidFill>
+            <a:prstDash val="sysDot"/>
+          </a:ln>
+        </p:spPr>
+        <p:style>
+          <a:lnRef idx="2">
+            <a:schemeClr val="accent1">
+              <a:shade val="50000"/>
+            </a:schemeClr>
+          </a:lnRef>
+          <a:fillRef idx="1">
+            <a:schemeClr val="accent1"/>
+          </a:fillRef>
+          <a:effectRef idx="0">
+            <a:schemeClr val="accent1"/>
+          </a:effectRef>
+          <a:fontRef idx="minor">
+            <a:schemeClr val="lt1"/>
+          </a:fontRef>
+        </p:style>
+        <p:txBody>
+          <a:bodyPr rtlCol="0" anchor="ctr"/>
+          <a:lstStyle/>
+          <a:p>
+            <a:pPr algn="ctr"/>
+            <a:endParaRPr lang="de-DE"/>
+          </a:p>
+        </p:txBody>
+      </p:sp>
+      <p:sp>
+        <p:nvSpPr>
+          <p:cNvPr id="139" name="Ellipse 138">
+            <a:extLst>
+              <a:ext uri="{FF2B5EF4-FFF2-40B4-BE49-F238E27FC236}">
+                <a16:creationId xmlns:a16="http://schemas.microsoft.com/office/drawing/2014/main" id="{80656F27-F183-48E6-8C44-191BD331A5BB}"/>
+              </a:ext>
+            </a:extLst>
+          </p:cNvPr>
+          <p:cNvSpPr/>
+          <p:nvPr/>
+        </p:nvSpPr>
+        <p:spPr>
+          <a:xfrm>
+            <a:off x="3362385" y="2883960"/>
+            <a:ext cx="688743" cy="214750"/>
+          </a:xfrm>
+          <a:prstGeom prst="ellipse">
+            <a:avLst/>
+          </a:prstGeom>
+          <a:noFill/>
+          <a:ln w="9525">
+            <a:solidFill>
+              <a:srgbClr val="262626"/>
+            </a:solidFill>
+            <a:prstDash val="sysDot"/>
+          </a:ln>
+        </p:spPr>
+        <p:style>
+          <a:lnRef idx="2">
+            <a:schemeClr val="accent1">
+              <a:shade val="50000"/>
+            </a:schemeClr>
+          </a:lnRef>
+          <a:fillRef idx="1">
+            <a:schemeClr val="accent1"/>
+          </a:fillRef>
+          <a:effectRef idx="0">
+            <a:schemeClr val="accent1"/>
+          </a:effectRef>
+          <a:fontRef idx="minor">
+            <a:schemeClr val="lt1"/>
+          </a:fontRef>
+        </p:style>
+        <p:txBody>
+          <a:bodyPr rtlCol="0" anchor="ctr"/>
+          <a:lstStyle/>
+          <a:p>
+            <a:pPr algn="ctr"/>
+            <a:endParaRPr lang="de-DE"/>
+          </a:p>
+        </p:txBody>
+      </p:sp>
+      <p:sp>
+        <p:nvSpPr>
+          <p:cNvPr id="147" name="Ellipse 146">
+            <a:extLst>
+              <a:ext uri="{FF2B5EF4-FFF2-40B4-BE49-F238E27FC236}">
+                <a16:creationId xmlns:a16="http://schemas.microsoft.com/office/drawing/2014/main" id="{F9780173-762D-43E1-B9CF-7A517052D2C8}"/>
+              </a:ext>
+            </a:extLst>
+          </p:cNvPr>
+          <p:cNvSpPr/>
+          <p:nvPr/>
+        </p:nvSpPr>
+        <p:spPr>
+          <a:xfrm rot="20985427">
+            <a:off x="5373244" y="3218065"/>
+            <a:ext cx="1232431" cy="337083"/>
+          </a:xfrm>
+          <a:prstGeom prst="ellipse">
+            <a:avLst/>
+          </a:prstGeom>
+          <a:noFill/>
+          <a:ln w="9525">
+            <a:solidFill>
+              <a:srgbClr val="262626"/>
+            </a:solidFill>
+            <a:prstDash val="sysDot"/>
+          </a:ln>
+        </p:spPr>
+        <p:style>
+          <a:lnRef idx="2">
+            <a:schemeClr val="accent1">
+              <a:shade val="50000"/>
+            </a:schemeClr>
+          </a:lnRef>
+          <a:fillRef idx="1">
+            <a:schemeClr val="accent1"/>
+          </a:fillRef>
+          <a:effectRef idx="0">
+            <a:schemeClr val="accent1"/>
+          </a:effectRef>
+          <a:fontRef idx="minor">
+            <a:schemeClr val="lt1"/>
+          </a:fontRef>
+        </p:style>
+        <p:txBody>
+          <a:bodyPr rtlCol="0" anchor="ctr"/>
+          <a:lstStyle/>
+          <a:p>
+            <a:pPr algn="ctr"/>
+            <a:endParaRPr lang="de-DE"/>
+          </a:p>
+        </p:txBody>
+      </p:sp>
+      <p:sp>
+        <p:nvSpPr>
+          <p:cNvPr id="149" name="Ellipse 148">
+            <a:extLst>
+              <a:ext uri="{FF2B5EF4-FFF2-40B4-BE49-F238E27FC236}">
+                <a16:creationId xmlns:a16="http://schemas.microsoft.com/office/drawing/2014/main" id="{73EF0CB6-3562-4DBE-9361-E2B1E84846D4}"/>
+              </a:ext>
+            </a:extLst>
+          </p:cNvPr>
+          <p:cNvSpPr/>
+          <p:nvPr/>
+        </p:nvSpPr>
+        <p:spPr>
+          <a:xfrm rot="16200000">
+            <a:off x="5456180" y="3121665"/>
+            <a:ext cx="1071371" cy="452125"/>
+          </a:xfrm>
+          <a:prstGeom prst="ellipse">
+            <a:avLst/>
+          </a:prstGeom>
+          <a:noFill/>
+          <a:ln w="9525">
+            <a:solidFill>
+              <a:srgbClr val="262626"/>
+            </a:solidFill>
+            <a:prstDash val="sysDot"/>
+          </a:ln>
+        </p:spPr>
+        <p:style>
+          <a:lnRef idx="2">
+            <a:schemeClr val="accent1">
+              <a:shade val="50000"/>
+            </a:schemeClr>
+          </a:lnRef>
+          <a:fillRef idx="1">
+            <a:schemeClr val="accent1"/>
+          </a:fillRef>
+          <a:effectRef idx="0">
+            <a:schemeClr val="accent1"/>
+          </a:effectRef>
+          <a:fontRef idx="minor">
+            <a:schemeClr val="lt1"/>
+          </a:fontRef>
+        </p:style>
+        <p:txBody>
+          <a:bodyPr rtlCol="0" anchor="ctr"/>
+          <a:lstStyle/>
+          <a:p>
+            <a:pPr algn="ctr"/>
+            <a:endParaRPr lang="de-DE"/>
           </a:p>
         </p:txBody>
       </p:sp>

</xml_diff>